<commit_message>
Update to GopherCon presentation
</commit_message>
<xml_diff>
--- a/2017_SCALE15/SCaLE-ConSchedAndSDSChangeCloud.pptx
+++ b/2017_SCALE15/SCaLE-ConSchedAndSDSChangeCloud.pptx
@@ -5463,7 +5463,7 @@
                   <a:schemeClr val="bg1"/>
                 </a:buClr>
               </a:pPr>
-              <a:t>1/27/2017</a:t>
+              <a:t>1/29/17</a:t>
             </a:fld>
             <a:endParaRPr lang="en-US" sz="900" dirty="0" smtClean="0">
               <a:solidFill>
@@ -5537,7 +5537,7 @@
                   <a:schemeClr val="bg1"/>
                 </a:buClr>
               </a:pPr>
-              <a:t>1/27/2017</a:t>
+              <a:t>1/29/17</a:t>
             </a:fld>
             <a:endParaRPr lang="en-US" sz="900" dirty="0" smtClean="0">
               <a:solidFill>
@@ -10325,9 +10325,14 @@
           </a:p>
           <a:p>
             <a:r>
-              <a:rPr lang="en-US" dirty="0" smtClean="0"/>
-              <a:t>Beginnings of self-aware applications</a:t>
-            </a:r>
+              <a:rPr lang="en-US"/>
+              <a:t>S</a:t>
+            </a:r>
+            <a:r>
+              <a:rPr lang="en-US" smtClean="0"/>
+              <a:t>elf-aware applications!</a:t>
+            </a:r>
+            <a:endParaRPr lang="en-US" dirty="0" smtClean="0"/>
           </a:p>
         </p:txBody>
       </p:sp>

</xml_diff>

<commit_message>
Update to slide deck
</commit_message>
<xml_diff>
--- a/2017_SCALE15/SCaLE-ConSchedAndSDSChangeCloud.pptx
+++ b/2017_SCALE15/SCaLE-ConSchedAndSDSChangeCloud.pptx
@@ -786,15 +786,7 @@
           <a:p>
             <a:r>
               <a:rPr lang="en-US" dirty="0" smtClean="0"/>
-              <a:t>Special</a:t>
-            </a:r>
-            <a:r>
-              <a:rPr lang="en-US" baseline="0" dirty="0" smtClean="0"/>
-              <a:t> branch of Dell EMC called </a:t>
-            </a:r>
-            <a:r>
-              <a:rPr lang="en-US" dirty="0" smtClean="0"/>
-              <a:t>{code} which works develops</a:t>
+              <a:t>{code} by Dell EMC which develops</a:t>
             </a:r>
             <a:r>
               <a:rPr lang="en-US" baseline="0" dirty="0" smtClean="0"/>
@@ -896,17 +888,21 @@
             </a:r>
             <a:r>
               <a:rPr lang="en-US" baseline="0" dirty="0" smtClean="0"/>
-              <a:t> this idea of creating a Software Defined Storage </a:t>
-            </a:r>
+              <a:t> this idea of creating a Software Defined Storage Mesos Framework.</a:t>
+            </a:r>
+          </a:p>
+          <a:p>
             <a:r>
               <a:rPr lang="en-US" baseline="0" dirty="0" smtClean="0"/>
-              <a:t>Mesos Framework.</a:t>
-            </a:r>
-          </a:p>
-          <a:p>
+              <a:t>This Framework would manage the lifecycle of </a:t>
+            </a:r>
+            <a:r>
+              <a:rPr lang="en-US" baseline="0" smtClean="0"/>
+              <a:t>this Software-based Storage </a:t>
+            </a:r>
             <a:r>
               <a:rPr lang="en-US" baseline="0" dirty="0" smtClean="0"/>
-              <a:t>This Framework would manage the lifecycle of this Software Defined Storage platform.</a:t>
+              <a:t>platform.</a:t>
             </a:r>
             <a:endParaRPr lang="en-US" dirty="0"/>
           </a:p>
@@ -1138,7 +1134,25 @@
             </a:r>
             <a:r>
               <a:rPr lang="en-US" baseline="0" dirty="0" smtClean="0"/>
-              <a:t> because the ScaleIO manages maintenance operations. Rebalancing due to a node failure.</a:t>
+              <a:t> because the ScaleIO manages maintenance operations. Rebalancing due to a node failure</a:t>
+            </a:r>
+            <a:r>
+              <a:rPr lang="en-US" baseline="0" dirty="0" smtClean="0"/>
+              <a:t>.</a:t>
+            </a:r>
+          </a:p>
+          <a:p>
+            <a:r>
+              <a:rPr lang="en-US" baseline="0" dirty="0" smtClean="0"/>
+              <a:t>Deploy Anywhere </a:t>
+            </a:r>
+            <a:r>
+              <a:rPr lang="mr-IN" baseline="0" dirty="0" smtClean="0"/>
+              <a:t>–</a:t>
+            </a:r>
+            <a:r>
+              <a:rPr lang="en-US" baseline="0" dirty="0" smtClean="0"/>
+              <a:t> because this is a Software-based Storage platform and its just simple RPMs or DEB. You can install this anywhere!</a:t>
             </a:r>
             <a:endParaRPr lang="en-US" dirty="0"/>
           </a:p>
@@ -1232,8 +1246,13 @@
           <a:p>
             <a:r>
               <a:rPr lang="en-US" dirty="0" smtClean="0"/>
-              <a:t>Why is this important?</a:t>
-            </a:r>
+              <a:t>Why is this important</a:t>
+            </a:r>
+            <a:r>
+              <a:rPr lang="en-US" dirty="0" smtClean="0"/>
+              <a:t>? Why do we care that we can deploy this anywhere?</a:t>
+            </a:r>
+            <a:endParaRPr lang="en-US" dirty="0" smtClean="0"/>
           </a:p>
           <a:p>
             <a:r>
@@ -1872,8 +1891,12 @@
           <a:lstStyle/>
           <a:p>
             <a:r>
-              <a:rPr lang="en-US" dirty="0" smtClean="0"/>
-              <a:t>So what</a:t>
+              <a:rPr lang="en-US" smtClean="0"/>
+              <a:t>RECAP: So </a:t>
+            </a:r>
+            <a:r>
+              <a:rPr lang="en-US" dirty="0" smtClean="0"/>
+              <a:t>what</a:t>
             </a:r>
             <a:r>
               <a:rPr lang="en-US" baseline="0" dirty="0" smtClean="0"/>
@@ -2448,6 +2471,28 @@
               <a:t> Places these containers on different compute nodes.</a:t>
             </a:r>
           </a:p>
+          <a:p>
+            <a:r>
+              <a:rPr lang="en-US" baseline="0" dirty="0" smtClean="0"/>
+              <a:t>Deterministic dispatch jobs </a:t>
+            </a:r>
+            <a:r>
+              <a:rPr lang="mr-IN" baseline="0" dirty="0" smtClean="0"/>
+              <a:t>–</a:t>
+            </a:r>
+            <a:r>
+              <a:rPr lang="en-US" baseline="0" dirty="0" smtClean="0"/>
+              <a:t> this allows me know how </a:t>
+            </a:r>
+            <a:r>
+              <a:rPr lang="en-US" baseline="0" dirty="0" err="1" smtClean="0"/>
+              <a:t>quicky</a:t>
+            </a:r>
+            <a:r>
+              <a:rPr lang="en-US" baseline="0" dirty="0" smtClean="0"/>
+              <a:t> I can scale my application</a:t>
+            </a:r>
+          </a:p>
         </p:txBody>
       </p:sp>
       <p:sp>
@@ -2835,17 +2880,8 @@
           <a:p>
             <a:r>
               <a:rPr lang="en-US" dirty="0" smtClean="0"/>
-              <a:t>Is </a:t>
-            </a:r>
-            <a:r>
-              <a:rPr lang="en-US" dirty="0" smtClean="0"/>
-              <a:t>a Container </a:t>
-            </a:r>
-            <a:r>
-              <a:rPr lang="en-US" dirty="0" smtClean="0"/>
-              <a:t>Scheduler. Supports:</a:t>
-            </a:r>
-            <a:endParaRPr lang="en-US" dirty="0" smtClean="0"/>
+              <a:t>Is a Container Scheduler. Supports:</a:t>
+            </a:r>
           </a:p>
           <a:p>
             <a:r>
@@ -3142,6 +3178,12 @@
             <a:r>
               <a:rPr lang="en-US" baseline="0" dirty="0" smtClean="0"/>
               <a:t> the executor and tasks get placed on one of the compute nodes.</a:t>
+            </a:r>
+          </a:p>
+          <a:p>
+            <a:r>
+              <a:rPr lang="en-US" baseline="0" dirty="0" smtClean="0"/>
+              <a:t>So we will see this exact process happening behind the scenes in the demo.</a:t>
             </a:r>
             <a:endParaRPr lang="en-US" dirty="0"/>
           </a:p>
@@ -7602,7 +7644,7 @@
                   <a:schemeClr val="bg1"/>
                 </a:buClr>
               </a:pPr>
-              <a:t>3/2/17</a:t>
+              <a:t>3/4/17</a:t>
             </a:fld>
             <a:endParaRPr lang="en-US" sz="900" dirty="0" smtClean="0">
               <a:solidFill>
@@ -7676,7 +7718,7 @@
                   <a:schemeClr val="bg1"/>
                 </a:buClr>
               </a:pPr>
-              <a:t>3/2/17</a:t>
+              <a:t>3/4/17</a:t>
             </a:fld>
             <a:endParaRPr lang="en-US" sz="900" dirty="0" smtClean="0">
               <a:solidFill>
@@ -8808,7 +8850,7 @@
           <a:p>
             <a:r>
               <a:rPr lang="en-US" dirty="0" smtClean="0"/>
-              <a:t>Quickly (and deterministically) dispatching jobs</a:t>
+              <a:t>Quickly (and deterministically) dispatch jobs</a:t>
             </a:r>
           </a:p>
           <a:p>
@@ -13198,15 +13240,7 @@
           <a:p>
             <a:r>
               <a:rPr lang="en-US" dirty="0" smtClean="0"/>
-              <a:t>Framework can monitor and self remediate </a:t>
-            </a:r>
-            <a:r>
-              <a:rPr lang="en-US" dirty="0" smtClean="0"/>
-              <a:t>this Software-based </a:t>
-            </a:r>
-            <a:r>
-              <a:rPr lang="en-US" dirty="0" smtClean="0"/>
-              <a:t>Storage Platform</a:t>
+              <a:t>Framework can monitor and self remediate this Software-based Storage Platform</a:t>
             </a:r>
           </a:p>
           <a:p>
@@ -13368,11 +13402,7 @@
           <a:p>
             <a:r>
               <a:rPr lang="en-US" dirty="0" smtClean="0"/>
-              <a:t>Software-Defined </a:t>
-            </a:r>
-            <a:r>
-              <a:rPr lang="en-US" dirty="0" smtClean="0"/>
-              <a:t>Storage</a:t>
+              <a:t>Software-Defined Storage</a:t>
             </a:r>
             <a:endParaRPr lang="en-US" dirty="0"/>
           </a:p>
@@ -16397,12 +16427,6 @@
               <a:t>Varying degrees of SDS: NFS, VMware VSAN</a:t>
             </a:r>
           </a:p>
-          <a:p>
-            <a:r>
-              <a:rPr lang="en-US" dirty="0" smtClean="0"/>
-              <a:t>NFS, VSAN are Software-based Storage Platforms!</a:t>
-            </a:r>
-          </a:p>
         </p:txBody>
       </p:sp>
     </p:spTree>

</xml_diff>